<commit_message>
Added an exercise to the slides in Sets
</commit_message>
<xml_diff>
--- a/src/12_Sets/Sets.pptx
+++ b/src/12_Sets/Sets.pptx
@@ -5,7 +5,7 @@
     <p:sldMasterId id="2147483648" r:id="rId1"/>
   </p:sldMasterIdLst>
   <p:notesMasterIdLst>
-    <p:notesMasterId r:id="rId20"/>
+    <p:notesMasterId r:id="rId21"/>
   </p:notesMasterIdLst>
   <p:sldIdLst>
     <p:sldId id="258" r:id="rId2"/>
@@ -22,10 +22,11 @@
     <p:sldId id="388" r:id="rId13"/>
     <p:sldId id="389" r:id="rId14"/>
     <p:sldId id="390" r:id="rId15"/>
-    <p:sldId id="391" r:id="rId16"/>
-    <p:sldId id="392" r:id="rId17"/>
-    <p:sldId id="393" r:id="rId18"/>
-    <p:sldId id="261" r:id="rId19"/>
+    <p:sldId id="394" r:id="rId16"/>
+    <p:sldId id="391" r:id="rId17"/>
+    <p:sldId id="392" r:id="rId18"/>
+    <p:sldId id="393" r:id="rId19"/>
+    <p:sldId id="261" r:id="rId20"/>
   </p:sldIdLst>
   <p:sldSz cx="12192000" cy="6858000"/>
   <p:notesSz cx="6858000" cy="9144000"/>
@@ -214,7 +215,7 @@
           <a:p>
             <a:fld id="{A5C20BB3-3CCB-4FE5-991B-82F6BCB48AF3}" type="datetimeFigureOut">
               <a:rPr lang="en-US" smtClean="0"/>
-              <a:t>10/17/18</a:t>
+              <a:t>11/15/18</a:t>
             </a:fld>
             <a:endParaRPr lang="en-US"/>
           </a:p>
@@ -610,7 +611,7 @@
           <a:p>
             <a:fld id="{B6C1A396-ADAF-C049-ABC6-C32D7D1CCAD8}" type="datetime1">
               <a:rPr lang="en-US" smtClean="0"/>
-              <a:t>10/17/18</a:t>
+              <a:t>11/15/18</a:t>
             </a:fld>
             <a:endParaRPr lang="en-US"/>
           </a:p>
@@ -778,7 +779,7 @@
           <a:p>
             <a:fld id="{1E275737-3B4B-C743-819D-3D7767301481}" type="datetime1">
               <a:rPr lang="en-US" smtClean="0"/>
-              <a:t>10/17/18</a:t>
+              <a:t>11/15/18</a:t>
             </a:fld>
             <a:endParaRPr lang="en-US"/>
           </a:p>
@@ -956,7 +957,7 @@
           <a:p>
             <a:fld id="{23E60EA0-28A6-2A4C-A0DF-F463B4716CF4}" type="datetime1">
               <a:rPr lang="en-US" smtClean="0"/>
-              <a:t>10/17/18</a:t>
+              <a:t>11/15/18</a:t>
             </a:fld>
             <a:endParaRPr lang="en-US"/>
           </a:p>
@@ -1124,7 +1125,7 @@
           <a:p>
             <a:fld id="{7F4ADCAF-FE79-6D4A-8F0C-FF6B2DC49B87}" type="datetime1">
               <a:rPr lang="en-US" smtClean="0"/>
-              <a:t>10/17/18</a:t>
+              <a:t>11/15/18</a:t>
             </a:fld>
             <a:endParaRPr lang="en-US"/>
           </a:p>
@@ -1369,7 +1370,7 @@
           <a:p>
             <a:fld id="{BB4170EC-B8E8-F84E-B40B-4CA40E87F0F1}" type="datetime1">
               <a:rPr lang="en-US" smtClean="0"/>
-              <a:t>10/17/18</a:t>
+              <a:t>11/15/18</a:t>
             </a:fld>
             <a:endParaRPr lang="en-US"/>
           </a:p>
@@ -1598,7 +1599,7 @@
           <a:p>
             <a:fld id="{3549A180-BBB6-AB44-9EC6-613957D9BC21}" type="datetime1">
               <a:rPr lang="en-US" smtClean="0"/>
-              <a:t>10/17/18</a:t>
+              <a:t>11/15/18</a:t>
             </a:fld>
             <a:endParaRPr lang="en-US"/>
           </a:p>
@@ -1962,7 +1963,7 @@
           <a:p>
             <a:fld id="{A29669B0-2692-6042-A028-87F920E9CE7A}" type="datetime1">
               <a:rPr lang="en-US" smtClean="0"/>
-              <a:t>10/17/18</a:t>
+              <a:t>11/15/18</a:t>
             </a:fld>
             <a:endParaRPr lang="en-US"/>
           </a:p>
@@ -2079,7 +2080,7 @@
           <a:p>
             <a:fld id="{26B5280F-B487-C54A-8A7A-C35A806AF023}" type="datetime1">
               <a:rPr lang="en-US" smtClean="0"/>
-              <a:t>10/17/18</a:t>
+              <a:t>11/15/18</a:t>
             </a:fld>
             <a:endParaRPr lang="en-US"/>
           </a:p>
@@ -2174,7 +2175,7 @@
           <a:p>
             <a:fld id="{FAAE216B-9CF3-A14B-9A92-B9DABF79BFCE}" type="datetime1">
               <a:rPr lang="en-US" smtClean="0"/>
-              <a:t>10/17/18</a:t>
+              <a:t>11/15/18</a:t>
             </a:fld>
             <a:endParaRPr lang="en-US"/>
           </a:p>
@@ -2449,7 +2450,7 @@
           <a:p>
             <a:fld id="{5B8013A5-7B70-2548-B20A-4534B630AB6C}" type="datetime1">
               <a:rPr lang="en-US" smtClean="0"/>
-              <a:t>10/17/18</a:t>
+              <a:t>11/15/18</a:t>
             </a:fld>
             <a:endParaRPr lang="en-US"/>
           </a:p>
@@ -2704,7 +2705,7 @@
           <a:p>
             <a:fld id="{E9928226-EDE2-0A4C-81FC-AFBDD145D237}" type="datetime1">
               <a:rPr lang="en-US" smtClean="0"/>
-              <a:t>10/17/18</a:t>
+              <a:t>11/15/18</a:t>
             </a:fld>
             <a:endParaRPr lang="en-US"/>
           </a:p>
@@ -2915,7 +2916,7 @@
           <a:p>
             <a:fld id="{7D3EA1F3-586E-4B46-9B9A-D49AC241EEC9}" type="datetime1">
               <a:rPr lang="en-US" smtClean="0"/>
-              <a:t>10/17/18</a:t>
+              <a:t>11/15/18</a:t>
             </a:fld>
             <a:endParaRPr lang="en-US"/>
           </a:p>
@@ -4615,7 +4616,7 @@
           <p:cNvPr id="2" name="Title 1">
             <a:extLst>
               <a:ext uri="{FF2B5EF4-FFF2-40B4-BE49-F238E27FC236}">
-                <a16:creationId xmlns:a16="http://schemas.microsoft.com/office/drawing/2014/main" id="{B80CC982-43E0-164B-904E-796E2D4B5E0F}"/>
+                <a16:creationId xmlns:a16="http://schemas.microsoft.com/office/drawing/2014/main" id="{B57A40A6-64B6-424B-9F77-1FD38CE28959}"/>
               </a:ext>
             </a:extLst>
           </p:cNvPr>
@@ -4633,7 +4634,7 @@
           <a:p>
             <a:r>
               <a:rPr lang="en-US" dirty="0"/>
-              <a:t>Set Complements</a:t>
+              <a:t>Exercises</a:t>
             </a:r>
           </a:p>
         </p:txBody>
@@ -4643,7 +4644,7 @@
           <p:cNvPr id="3" name="Content Placeholder 2">
             <a:extLst>
               <a:ext uri="{FF2B5EF4-FFF2-40B4-BE49-F238E27FC236}">
-                <a16:creationId xmlns:a16="http://schemas.microsoft.com/office/drawing/2014/main" id="{B1750D2F-D03E-B547-8B02-F3391736875B}"/>
+                <a16:creationId xmlns:a16="http://schemas.microsoft.com/office/drawing/2014/main" id="{88BCF5BF-E4A3-2C4D-8113-49B292E599A0}"/>
               </a:ext>
             </a:extLst>
           </p:cNvPr>
@@ -4661,19 +4662,43 @@
           <a:p>
             <a:r>
               <a:rPr lang="en-US" dirty="0"/>
-              <a:t>The complement of the set A is written as -A and contains all of the elements in the type associated with set A that is not in set A.</a:t>
-            </a:r>
-          </a:p>
-          <a:p>
-            <a:r>
-              <a:rPr lang="en-US" dirty="0"/>
-              <a:t>The complement of the set of even numbers is the set of odd numbers.</a:t>
-            </a:r>
-          </a:p>
-          <a:p>
-            <a:r>
-              <a:rPr lang="en-US" dirty="0"/>
-              <a:t>Yet another proof</a:t>
+              <a:t>How many elements are in the powerset of the vowels {a, b, c, d, e}?</a:t>
+            </a:r>
+          </a:p>
+          <a:p>
+            <a:r>
+              <a:rPr lang="en-US" dirty="0"/>
+              <a:t>How many sets in this set have 1 element in them?</a:t>
+            </a:r>
+          </a:p>
+          <a:p>
+            <a:r>
+              <a:rPr lang="en-US" dirty="0"/>
+              <a:t>How many sets have 2 elements in them?</a:t>
+            </a:r>
+          </a:p>
+          <a:p>
+            <a:r>
+              <a:rPr lang="en-US" dirty="0"/>
+              <a:t>How many sets have 3 elements in them?</a:t>
+            </a:r>
+          </a:p>
+          <a:p>
+            <a:r>
+              <a:rPr lang="en-US" dirty="0"/>
+              <a:t>How many sets have 4 elements in them?</a:t>
+            </a:r>
+          </a:p>
+          <a:p>
+            <a:r>
+              <a:rPr lang="en-US" dirty="0"/>
+              <a:t>How many sets have 5 elements in them?</a:t>
+            </a:r>
+          </a:p>
+          <a:p>
+            <a:r>
+              <a:rPr lang="en-US" dirty="0"/>
+              <a:t>How many elements are in the product set of the vowels with itself?</a:t>
             </a:r>
           </a:p>
         </p:txBody>
@@ -4683,7 +4708,7 @@
           <p:cNvPr id="4" name="Slide Number Placeholder 3">
             <a:extLst>
               <a:ext uri="{FF2B5EF4-FFF2-40B4-BE49-F238E27FC236}">
-                <a16:creationId xmlns:a16="http://schemas.microsoft.com/office/drawing/2014/main" id="{8EC5F75F-40F7-BE40-AFA8-F67C5746E611}"/>
+                <a16:creationId xmlns:a16="http://schemas.microsoft.com/office/drawing/2014/main" id="{8B99365F-A4CE-2642-91B9-20DE48DA013F}"/>
               </a:ext>
             </a:extLst>
           </p:cNvPr>
@@ -4710,13 +4735,337 @@
     </p:spTree>
     <p:extLst>
       <p:ext uri="{BB962C8B-B14F-4D97-AF65-F5344CB8AC3E}">
-        <p14:creationId xmlns:p14="http://schemas.microsoft.com/office/powerpoint/2010/main" val="1269856327"/>
+        <p14:creationId xmlns:p14="http://schemas.microsoft.com/office/powerpoint/2010/main" val="3258503631"/>
       </p:ext>
     </p:extLst>
   </p:cSld>
   <p:clrMapOvr>
     <a:masterClrMapping/>
   </p:clrMapOvr>
+  <p:timing>
+    <p:tnLst>
+      <p:par>
+        <p:cTn id="1" dur="indefinite" restart="never" nodeType="tmRoot">
+          <p:childTnLst>
+            <p:seq concurrent="1" nextAc="seek">
+              <p:cTn id="2" dur="indefinite" nodeType="mainSeq">
+                <p:childTnLst>
+                  <p:par>
+                    <p:cTn id="3" fill="hold">
+                      <p:stCondLst>
+                        <p:cond delay="indefinite"/>
+                      </p:stCondLst>
+                      <p:childTnLst>
+                        <p:par>
+                          <p:cTn id="4" fill="hold">
+                            <p:stCondLst>
+                              <p:cond delay="0"/>
+                            </p:stCondLst>
+                            <p:childTnLst>
+                              <p:par>
+                                <p:cTn id="5" presetID="1" presetClass="entr" presetSubtype="0" fill="hold" nodeType="clickEffect">
+                                  <p:stCondLst>
+                                    <p:cond delay="0"/>
+                                  </p:stCondLst>
+                                  <p:childTnLst>
+                                    <p:set>
+                                      <p:cBhvr>
+                                        <p:cTn id="6" dur="1" fill="hold">
+                                          <p:stCondLst>
+                                            <p:cond delay="0"/>
+                                          </p:stCondLst>
+                                        </p:cTn>
+                                        <p:tgtEl>
+                                          <p:spTgt spid="3">
+                                            <p:txEl>
+                                              <p:pRg st="1" end="1"/>
+                                            </p:txEl>
+                                          </p:spTgt>
+                                        </p:tgtEl>
+                                        <p:attrNameLst>
+                                          <p:attrName>style.visibility</p:attrName>
+                                        </p:attrNameLst>
+                                      </p:cBhvr>
+                                      <p:to>
+                                        <p:strVal val="visible"/>
+                                      </p:to>
+                                    </p:set>
+                                  </p:childTnLst>
+                                </p:cTn>
+                              </p:par>
+                            </p:childTnLst>
+                          </p:cTn>
+                        </p:par>
+                      </p:childTnLst>
+                    </p:cTn>
+                  </p:par>
+                  <p:par>
+                    <p:cTn id="7" fill="hold">
+                      <p:stCondLst>
+                        <p:cond delay="indefinite"/>
+                      </p:stCondLst>
+                      <p:childTnLst>
+                        <p:par>
+                          <p:cTn id="8" fill="hold">
+                            <p:stCondLst>
+                              <p:cond delay="0"/>
+                            </p:stCondLst>
+                            <p:childTnLst>
+                              <p:par>
+                                <p:cTn id="9" presetID="1" presetClass="entr" presetSubtype="0" fill="hold" nodeType="clickEffect">
+                                  <p:stCondLst>
+                                    <p:cond delay="0"/>
+                                  </p:stCondLst>
+                                  <p:childTnLst>
+                                    <p:set>
+                                      <p:cBhvr>
+                                        <p:cTn id="10" dur="1" fill="hold">
+                                          <p:stCondLst>
+                                            <p:cond delay="0"/>
+                                          </p:stCondLst>
+                                        </p:cTn>
+                                        <p:tgtEl>
+                                          <p:spTgt spid="3">
+                                            <p:txEl>
+                                              <p:pRg st="2" end="2"/>
+                                            </p:txEl>
+                                          </p:spTgt>
+                                        </p:tgtEl>
+                                        <p:attrNameLst>
+                                          <p:attrName>style.visibility</p:attrName>
+                                        </p:attrNameLst>
+                                      </p:cBhvr>
+                                      <p:to>
+                                        <p:strVal val="visible"/>
+                                      </p:to>
+                                    </p:set>
+                                  </p:childTnLst>
+                                </p:cTn>
+                              </p:par>
+                            </p:childTnLst>
+                          </p:cTn>
+                        </p:par>
+                      </p:childTnLst>
+                    </p:cTn>
+                  </p:par>
+                  <p:par>
+                    <p:cTn id="11" fill="hold">
+                      <p:stCondLst>
+                        <p:cond delay="indefinite"/>
+                      </p:stCondLst>
+                      <p:childTnLst>
+                        <p:par>
+                          <p:cTn id="12" fill="hold">
+                            <p:stCondLst>
+                              <p:cond delay="0"/>
+                            </p:stCondLst>
+                            <p:childTnLst>
+                              <p:par>
+                                <p:cTn id="13" presetID="1" presetClass="entr" presetSubtype="0" fill="hold" nodeType="clickEffect">
+                                  <p:stCondLst>
+                                    <p:cond delay="0"/>
+                                  </p:stCondLst>
+                                  <p:childTnLst>
+                                    <p:set>
+                                      <p:cBhvr>
+                                        <p:cTn id="14" dur="1" fill="hold">
+                                          <p:stCondLst>
+                                            <p:cond delay="0"/>
+                                          </p:stCondLst>
+                                        </p:cTn>
+                                        <p:tgtEl>
+                                          <p:spTgt spid="3">
+                                            <p:txEl>
+                                              <p:pRg st="3" end="3"/>
+                                            </p:txEl>
+                                          </p:spTgt>
+                                        </p:tgtEl>
+                                        <p:attrNameLst>
+                                          <p:attrName>style.visibility</p:attrName>
+                                        </p:attrNameLst>
+                                      </p:cBhvr>
+                                      <p:to>
+                                        <p:strVal val="visible"/>
+                                      </p:to>
+                                    </p:set>
+                                  </p:childTnLst>
+                                </p:cTn>
+                              </p:par>
+                            </p:childTnLst>
+                          </p:cTn>
+                        </p:par>
+                      </p:childTnLst>
+                    </p:cTn>
+                  </p:par>
+                  <p:par>
+                    <p:cTn id="15" fill="hold">
+                      <p:stCondLst>
+                        <p:cond delay="indefinite"/>
+                      </p:stCondLst>
+                      <p:childTnLst>
+                        <p:par>
+                          <p:cTn id="16" fill="hold">
+                            <p:stCondLst>
+                              <p:cond delay="0"/>
+                            </p:stCondLst>
+                            <p:childTnLst>
+                              <p:par>
+                                <p:cTn id="17" presetID="1" presetClass="entr" presetSubtype="0" fill="hold" nodeType="clickEffect">
+                                  <p:stCondLst>
+                                    <p:cond delay="0"/>
+                                  </p:stCondLst>
+                                  <p:childTnLst>
+                                    <p:set>
+                                      <p:cBhvr>
+                                        <p:cTn id="18" dur="1" fill="hold">
+                                          <p:stCondLst>
+                                            <p:cond delay="0"/>
+                                          </p:stCondLst>
+                                        </p:cTn>
+                                        <p:tgtEl>
+                                          <p:spTgt spid="3">
+                                            <p:txEl>
+                                              <p:pRg st="4" end="4"/>
+                                            </p:txEl>
+                                          </p:spTgt>
+                                        </p:tgtEl>
+                                        <p:attrNameLst>
+                                          <p:attrName>style.visibility</p:attrName>
+                                        </p:attrNameLst>
+                                      </p:cBhvr>
+                                      <p:to>
+                                        <p:strVal val="visible"/>
+                                      </p:to>
+                                    </p:set>
+                                  </p:childTnLst>
+                                </p:cTn>
+                              </p:par>
+                            </p:childTnLst>
+                          </p:cTn>
+                        </p:par>
+                      </p:childTnLst>
+                    </p:cTn>
+                  </p:par>
+                  <p:par>
+                    <p:cTn id="19" fill="hold">
+                      <p:stCondLst>
+                        <p:cond delay="indefinite"/>
+                      </p:stCondLst>
+                      <p:childTnLst>
+                        <p:par>
+                          <p:cTn id="20" fill="hold">
+                            <p:stCondLst>
+                              <p:cond delay="0"/>
+                            </p:stCondLst>
+                            <p:childTnLst>
+                              <p:par>
+                                <p:cTn id="21" presetID="1" presetClass="entr" presetSubtype="0" fill="hold" nodeType="clickEffect">
+                                  <p:stCondLst>
+                                    <p:cond delay="0"/>
+                                  </p:stCondLst>
+                                  <p:childTnLst>
+                                    <p:set>
+                                      <p:cBhvr>
+                                        <p:cTn id="22" dur="1" fill="hold">
+                                          <p:stCondLst>
+                                            <p:cond delay="0"/>
+                                          </p:stCondLst>
+                                        </p:cTn>
+                                        <p:tgtEl>
+                                          <p:spTgt spid="3">
+                                            <p:txEl>
+                                              <p:pRg st="5" end="5"/>
+                                            </p:txEl>
+                                          </p:spTgt>
+                                        </p:tgtEl>
+                                        <p:attrNameLst>
+                                          <p:attrName>style.visibility</p:attrName>
+                                        </p:attrNameLst>
+                                      </p:cBhvr>
+                                      <p:to>
+                                        <p:strVal val="visible"/>
+                                      </p:to>
+                                    </p:set>
+                                  </p:childTnLst>
+                                </p:cTn>
+                              </p:par>
+                            </p:childTnLst>
+                          </p:cTn>
+                        </p:par>
+                      </p:childTnLst>
+                    </p:cTn>
+                  </p:par>
+                  <p:par>
+                    <p:cTn id="23" fill="hold">
+                      <p:stCondLst>
+                        <p:cond delay="indefinite"/>
+                      </p:stCondLst>
+                      <p:childTnLst>
+                        <p:par>
+                          <p:cTn id="24" fill="hold">
+                            <p:stCondLst>
+                              <p:cond delay="0"/>
+                            </p:stCondLst>
+                            <p:childTnLst>
+                              <p:par>
+                                <p:cTn id="25" presetID="1" presetClass="entr" presetSubtype="0" fill="hold" nodeType="clickEffect">
+                                  <p:stCondLst>
+                                    <p:cond delay="0"/>
+                                  </p:stCondLst>
+                                  <p:childTnLst>
+                                    <p:set>
+                                      <p:cBhvr>
+                                        <p:cTn id="26" dur="1" fill="hold">
+                                          <p:stCondLst>
+                                            <p:cond delay="0"/>
+                                          </p:stCondLst>
+                                        </p:cTn>
+                                        <p:tgtEl>
+                                          <p:spTgt spid="3">
+                                            <p:txEl>
+                                              <p:pRg st="6" end="6"/>
+                                            </p:txEl>
+                                          </p:spTgt>
+                                        </p:tgtEl>
+                                        <p:attrNameLst>
+                                          <p:attrName>style.visibility</p:attrName>
+                                        </p:attrNameLst>
+                                      </p:cBhvr>
+                                      <p:to>
+                                        <p:strVal val="visible"/>
+                                      </p:to>
+                                    </p:set>
+                                  </p:childTnLst>
+                                </p:cTn>
+                              </p:par>
+                            </p:childTnLst>
+                          </p:cTn>
+                        </p:par>
+                      </p:childTnLst>
+                    </p:cTn>
+                  </p:par>
+                </p:childTnLst>
+              </p:cTn>
+              <p:prevCondLst>
+                <p:cond evt="onPrev" delay="0">
+                  <p:tgtEl>
+                    <p:sldTgt/>
+                  </p:tgtEl>
+                </p:cond>
+              </p:prevCondLst>
+              <p:nextCondLst>
+                <p:cond evt="onNext" delay="0">
+                  <p:tgtEl>
+                    <p:sldTgt/>
+                  </p:tgtEl>
+                </p:cond>
+              </p:nextCondLst>
+            </p:seq>
+          </p:childTnLst>
+        </p:cTn>
+      </p:par>
+    </p:tnLst>
+  </p:timing>
 </p:sld>
 </file>
 
@@ -4742,7 +5091,7 @@
           <p:cNvPr id="2" name="Title 1">
             <a:extLst>
               <a:ext uri="{FF2B5EF4-FFF2-40B4-BE49-F238E27FC236}">
-                <a16:creationId xmlns:a16="http://schemas.microsoft.com/office/drawing/2014/main" id="{99C04427-1A96-C341-B0B2-8073C1AAC18A}"/>
+                <a16:creationId xmlns:a16="http://schemas.microsoft.com/office/drawing/2014/main" id="{B80CC982-43E0-164B-904E-796E2D4B5E0F}"/>
               </a:ext>
             </a:extLst>
           </p:cNvPr>
@@ -4760,7 +5109,7 @@
           <a:p>
             <a:r>
               <a:rPr lang="en-US" dirty="0"/>
-              <a:t>Insertion</a:t>
+              <a:t>Set Complements</a:t>
             </a:r>
           </a:p>
         </p:txBody>
@@ -4770,7 +5119,7 @@
           <p:cNvPr id="3" name="Content Placeholder 2">
             <a:extLst>
               <a:ext uri="{FF2B5EF4-FFF2-40B4-BE49-F238E27FC236}">
-                <a16:creationId xmlns:a16="http://schemas.microsoft.com/office/drawing/2014/main" id="{C7F83103-108C-F540-BCEA-B554516A6CFF}"/>
+                <a16:creationId xmlns:a16="http://schemas.microsoft.com/office/drawing/2014/main" id="{B1750D2F-D03E-B547-8B02-F3391736875B}"/>
               </a:ext>
             </a:extLst>
           </p:cNvPr>
@@ -4788,130 +5137,20 @@
           <a:p>
             <a:r>
               <a:rPr lang="en-US" dirty="0"/>
-              <a:t>Lean supports syntax for adding (inserting) elements into a set to create another set (the original set is unmodified)</a:t>
-            </a:r>
-          </a:p>
-          <a:p>
-            <a:pPr marL="0" indent="0">
-              <a:buNone/>
-            </a:pPr>
-            <a:r>
-              <a:rPr lang="en-US" sz="2400" dirty="0">
-                <a:latin typeface="Courier New" panose="02070309020205020404" pitchFamily="49" charset="0"/>
-                <a:cs typeface="Courier New" panose="02070309020205020404" pitchFamily="49" charset="0"/>
-              </a:rPr>
-              <a:t>def </a:t>
-            </a:r>
-            <a:r>
-              <a:rPr lang="en-US" sz="2400" dirty="0" err="1">
-                <a:latin typeface="Courier New" panose="02070309020205020404" pitchFamily="49" charset="0"/>
-                <a:cs typeface="Courier New" panose="02070309020205020404" pitchFamily="49" charset="0"/>
-              </a:rPr>
-              <a:t>myInsert</a:t>
-            </a:r>
-            <a:r>
-              <a:rPr lang="en-US" sz="2400" dirty="0">
-                <a:latin typeface="Courier New" panose="02070309020205020404" pitchFamily="49" charset="0"/>
-                <a:cs typeface="Courier New" panose="02070309020205020404" pitchFamily="49" charset="0"/>
-              </a:rPr>
-              <a:t> </a:t>
-            </a:r>
-          </a:p>
-          <a:p>
-            <a:pPr marL="0" indent="0">
-              <a:buNone/>
-            </a:pPr>
-            <a:r>
-              <a:rPr lang="en-US" sz="2400" dirty="0">
-                <a:latin typeface="Courier New" panose="02070309020205020404" pitchFamily="49" charset="0"/>
-                <a:cs typeface="Courier New" panose="02070309020205020404" pitchFamily="49" charset="0"/>
-              </a:rPr>
-              <a:t>  {T </a:t>
-            </a:r>
-            <a:r>
-              <a:rPr lang="en-US" sz="2400">
-                <a:latin typeface="Courier New" panose="02070309020205020404" pitchFamily="49" charset="0"/>
-                <a:cs typeface="Courier New" panose="02070309020205020404" pitchFamily="49" charset="0"/>
-              </a:rPr>
-              <a:t>: Type} (a: </a:t>
-            </a:r>
-            <a:r>
-              <a:rPr lang="en-US" sz="2400" dirty="0">
-                <a:latin typeface="Courier New" panose="02070309020205020404" pitchFamily="49" charset="0"/>
-                <a:cs typeface="Courier New" panose="02070309020205020404" pitchFamily="49" charset="0"/>
-              </a:rPr>
-              <a:t>T) </a:t>
-            </a:r>
-            <a:r>
-              <a:rPr lang="en-US" sz="2400">
-                <a:latin typeface="Courier New" panose="02070309020205020404" pitchFamily="49" charset="0"/>
-                <a:cs typeface="Courier New" panose="02070309020205020404" pitchFamily="49" charset="0"/>
-              </a:rPr>
-              <a:t>(s: </a:t>
-            </a:r>
-            <a:r>
-              <a:rPr lang="en-US" sz="2400" dirty="0">
-                <a:latin typeface="Courier New" panose="02070309020205020404" pitchFamily="49" charset="0"/>
-                <a:cs typeface="Courier New" panose="02070309020205020404" pitchFamily="49" charset="0"/>
-              </a:rPr>
-              <a:t>set </a:t>
-            </a:r>
-            <a:r>
-              <a:rPr lang="en-US" sz="2400">
-                <a:latin typeface="Courier New" panose="02070309020205020404" pitchFamily="49" charset="0"/>
-                <a:cs typeface="Courier New" panose="02070309020205020404" pitchFamily="49" charset="0"/>
-              </a:rPr>
-              <a:t>T): </a:t>
-            </a:r>
-            <a:r>
-              <a:rPr lang="en-US" sz="2400" dirty="0">
-                <a:latin typeface="Courier New" panose="02070309020205020404" pitchFamily="49" charset="0"/>
-                <a:cs typeface="Courier New" panose="02070309020205020404" pitchFamily="49" charset="0"/>
-              </a:rPr>
-              <a:t>set T :=</a:t>
-            </a:r>
-          </a:p>
-          <a:p>
-            <a:pPr marL="0" indent="0">
-              <a:buNone/>
-            </a:pPr>
-            <a:r>
-              <a:rPr lang="en-US" sz="2400" dirty="0">
-                <a:latin typeface="Courier New" panose="02070309020205020404" pitchFamily="49" charset="0"/>
-                <a:cs typeface="Courier New" panose="02070309020205020404" pitchFamily="49" charset="0"/>
-              </a:rPr>
-              <a:t>    {b | b = a ∨ b ∈ s}</a:t>
-            </a:r>
-          </a:p>
-          <a:p>
-            <a:r>
-              <a:rPr lang="en-US" sz="2400" dirty="0">
-                <a:latin typeface="Courier New" panose="02070309020205020404" pitchFamily="49" charset="0"/>
-                <a:cs typeface="Courier New" panose="02070309020205020404" pitchFamily="49" charset="0"/>
-              </a:rPr>
-              <a:t>insert 5 {1, 2, 3, 4}</a:t>
-            </a:r>
-            <a:r>
-              <a:rPr lang="en-US" dirty="0"/>
-              <a:t> yields the set </a:t>
-            </a:r>
-            <a:r>
-              <a:rPr lang="en-US" sz="2400" dirty="0">
-                <a:latin typeface="Courier New" panose="02070309020205020404" pitchFamily="49" charset="0"/>
-                <a:cs typeface="Courier New" panose="02070309020205020404" pitchFamily="49" charset="0"/>
-              </a:rPr>
-              <a:t>{1, 2, 3, 4, 5}</a:t>
-            </a:r>
-            <a:endParaRPr lang="en-US" dirty="0">
-              <a:latin typeface="Courier New" panose="02070309020205020404" pitchFamily="49" charset="0"/>
-              <a:cs typeface="Courier New" panose="02070309020205020404" pitchFamily="49" charset="0"/>
-            </a:endParaRPr>
-          </a:p>
-          <a:p>
-            <a:endParaRPr lang="en-US" dirty="0"/>
-          </a:p>
-          <a:p>
-            <a:endParaRPr lang="en-US" dirty="0"/>
+              <a:t>The complement of the set A is written as -A and contains all of the elements in the type associated with set A that is not in set A.</a:t>
+            </a:r>
+          </a:p>
+          <a:p>
+            <a:r>
+              <a:rPr lang="en-US" dirty="0"/>
+              <a:t>The complement of the set of even numbers is the set of odd numbers.</a:t>
+            </a:r>
+          </a:p>
+          <a:p>
+            <a:r>
+              <a:rPr lang="en-US" dirty="0"/>
+              <a:t>Yet another proof</a:t>
+            </a:r>
           </a:p>
         </p:txBody>
       </p:sp>
@@ -4920,7 +5159,7 @@
           <p:cNvPr id="4" name="Slide Number Placeholder 3">
             <a:extLst>
               <a:ext uri="{FF2B5EF4-FFF2-40B4-BE49-F238E27FC236}">
-                <a16:creationId xmlns:a16="http://schemas.microsoft.com/office/drawing/2014/main" id="{BDAF7946-1B13-1C40-9F2E-DF5B8603CFD2}"/>
+                <a16:creationId xmlns:a16="http://schemas.microsoft.com/office/drawing/2014/main" id="{8EC5F75F-40F7-BE40-AFA8-F67C5746E611}"/>
               </a:ext>
             </a:extLst>
           </p:cNvPr>
@@ -4947,7 +5186,7 @@
     </p:spTree>
     <p:extLst>
       <p:ext uri="{BB962C8B-B14F-4D97-AF65-F5344CB8AC3E}">
-        <p14:creationId xmlns:p14="http://schemas.microsoft.com/office/powerpoint/2010/main" val="2037131543"/>
+        <p14:creationId xmlns:p14="http://schemas.microsoft.com/office/powerpoint/2010/main" val="1269856327"/>
       </p:ext>
     </p:extLst>
   </p:cSld>
@@ -4979,6 +5218,243 @@
           <p:cNvPr id="2" name="Title 1">
             <a:extLst>
               <a:ext uri="{FF2B5EF4-FFF2-40B4-BE49-F238E27FC236}">
+                <a16:creationId xmlns:a16="http://schemas.microsoft.com/office/drawing/2014/main" id="{99C04427-1A96-C341-B0B2-8073C1AAC18A}"/>
+              </a:ext>
+            </a:extLst>
+          </p:cNvPr>
+          <p:cNvSpPr>
+            <a:spLocks noGrp="1"/>
+          </p:cNvSpPr>
+          <p:nvPr>
+            <p:ph type="title"/>
+          </p:nvPr>
+        </p:nvSpPr>
+        <p:spPr/>
+        <p:txBody>
+          <a:bodyPr/>
+          <a:lstStyle/>
+          <a:p>
+            <a:r>
+              <a:rPr lang="en-US" dirty="0"/>
+              <a:t>Insertion</a:t>
+            </a:r>
+          </a:p>
+        </p:txBody>
+      </p:sp>
+      <p:sp>
+        <p:nvSpPr>
+          <p:cNvPr id="3" name="Content Placeholder 2">
+            <a:extLst>
+              <a:ext uri="{FF2B5EF4-FFF2-40B4-BE49-F238E27FC236}">
+                <a16:creationId xmlns:a16="http://schemas.microsoft.com/office/drawing/2014/main" id="{C7F83103-108C-F540-BCEA-B554516A6CFF}"/>
+              </a:ext>
+            </a:extLst>
+          </p:cNvPr>
+          <p:cNvSpPr>
+            <a:spLocks noGrp="1"/>
+          </p:cNvSpPr>
+          <p:nvPr>
+            <p:ph idx="1"/>
+          </p:nvPr>
+        </p:nvSpPr>
+        <p:spPr/>
+        <p:txBody>
+          <a:bodyPr/>
+          <a:lstStyle/>
+          <a:p>
+            <a:r>
+              <a:rPr lang="en-US" dirty="0"/>
+              <a:t>Lean supports syntax for adding (inserting) elements into a set to create another set (the original set is unmodified)</a:t>
+            </a:r>
+          </a:p>
+          <a:p>
+            <a:pPr marL="0" indent="0">
+              <a:buNone/>
+            </a:pPr>
+            <a:r>
+              <a:rPr lang="en-US" sz="2400" dirty="0">
+                <a:latin typeface="Courier New" panose="02070309020205020404" pitchFamily="49" charset="0"/>
+                <a:cs typeface="Courier New" panose="02070309020205020404" pitchFamily="49" charset="0"/>
+              </a:rPr>
+              <a:t>def </a:t>
+            </a:r>
+            <a:r>
+              <a:rPr lang="en-US" sz="2400" dirty="0" err="1">
+                <a:latin typeface="Courier New" panose="02070309020205020404" pitchFamily="49" charset="0"/>
+                <a:cs typeface="Courier New" panose="02070309020205020404" pitchFamily="49" charset="0"/>
+              </a:rPr>
+              <a:t>myInsert</a:t>
+            </a:r>
+            <a:r>
+              <a:rPr lang="en-US" sz="2400" dirty="0">
+                <a:latin typeface="Courier New" panose="02070309020205020404" pitchFamily="49" charset="0"/>
+                <a:cs typeface="Courier New" panose="02070309020205020404" pitchFamily="49" charset="0"/>
+              </a:rPr>
+              <a:t> </a:t>
+            </a:r>
+          </a:p>
+          <a:p>
+            <a:pPr marL="0" indent="0">
+              <a:buNone/>
+            </a:pPr>
+            <a:r>
+              <a:rPr lang="en-US" sz="2400" dirty="0">
+                <a:latin typeface="Courier New" panose="02070309020205020404" pitchFamily="49" charset="0"/>
+                <a:cs typeface="Courier New" panose="02070309020205020404" pitchFamily="49" charset="0"/>
+              </a:rPr>
+              <a:t>  {T </a:t>
+            </a:r>
+            <a:r>
+              <a:rPr lang="en-US" sz="2400">
+                <a:latin typeface="Courier New" panose="02070309020205020404" pitchFamily="49" charset="0"/>
+                <a:cs typeface="Courier New" panose="02070309020205020404" pitchFamily="49" charset="0"/>
+              </a:rPr>
+              <a:t>: Type} (a: </a:t>
+            </a:r>
+            <a:r>
+              <a:rPr lang="en-US" sz="2400" dirty="0">
+                <a:latin typeface="Courier New" panose="02070309020205020404" pitchFamily="49" charset="0"/>
+                <a:cs typeface="Courier New" panose="02070309020205020404" pitchFamily="49" charset="0"/>
+              </a:rPr>
+              <a:t>T) </a:t>
+            </a:r>
+            <a:r>
+              <a:rPr lang="en-US" sz="2400">
+                <a:latin typeface="Courier New" panose="02070309020205020404" pitchFamily="49" charset="0"/>
+                <a:cs typeface="Courier New" panose="02070309020205020404" pitchFamily="49" charset="0"/>
+              </a:rPr>
+              <a:t>(s: </a:t>
+            </a:r>
+            <a:r>
+              <a:rPr lang="en-US" sz="2400" dirty="0">
+                <a:latin typeface="Courier New" panose="02070309020205020404" pitchFamily="49" charset="0"/>
+                <a:cs typeface="Courier New" panose="02070309020205020404" pitchFamily="49" charset="0"/>
+              </a:rPr>
+              <a:t>set </a:t>
+            </a:r>
+            <a:r>
+              <a:rPr lang="en-US" sz="2400">
+                <a:latin typeface="Courier New" panose="02070309020205020404" pitchFamily="49" charset="0"/>
+                <a:cs typeface="Courier New" panose="02070309020205020404" pitchFamily="49" charset="0"/>
+              </a:rPr>
+              <a:t>T): </a:t>
+            </a:r>
+            <a:r>
+              <a:rPr lang="en-US" sz="2400" dirty="0">
+                <a:latin typeface="Courier New" panose="02070309020205020404" pitchFamily="49" charset="0"/>
+                <a:cs typeface="Courier New" panose="02070309020205020404" pitchFamily="49" charset="0"/>
+              </a:rPr>
+              <a:t>set T :=</a:t>
+            </a:r>
+          </a:p>
+          <a:p>
+            <a:pPr marL="0" indent="0">
+              <a:buNone/>
+            </a:pPr>
+            <a:r>
+              <a:rPr lang="en-US" sz="2400" dirty="0">
+                <a:latin typeface="Courier New" panose="02070309020205020404" pitchFamily="49" charset="0"/>
+                <a:cs typeface="Courier New" panose="02070309020205020404" pitchFamily="49" charset="0"/>
+              </a:rPr>
+              <a:t>    {b | b = a ∨ b ∈ s}</a:t>
+            </a:r>
+          </a:p>
+          <a:p>
+            <a:r>
+              <a:rPr lang="en-US" sz="2400" dirty="0">
+                <a:latin typeface="Courier New" panose="02070309020205020404" pitchFamily="49" charset="0"/>
+                <a:cs typeface="Courier New" panose="02070309020205020404" pitchFamily="49" charset="0"/>
+              </a:rPr>
+              <a:t>insert 5 {1, 2, 3, 4}</a:t>
+            </a:r>
+            <a:r>
+              <a:rPr lang="en-US" dirty="0"/>
+              <a:t> yields the set </a:t>
+            </a:r>
+            <a:r>
+              <a:rPr lang="en-US" sz="2400" dirty="0">
+                <a:latin typeface="Courier New" panose="02070309020205020404" pitchFamily="49" charset="0"/>
+                <a:cs typeface="Courier New" panose="02070309020205020404" pitchFamily="49" charset="0"/>
+              </a:rPr>
+              <a:t>{1, 2, 3, 4, 5}</a:t>
+            </a:r>
+            <a:endParaRPr lang="en-US" dirty="0">
+              <a:latin typeface="Courier New" panose="02070309020205020404" pitchFamily="49" charset="0"/>
+              <a:cs typeface="Courier New" panose="02070309020205020404" pitchFamily="49" charset="0"/>
+            </a:endParaRPr>
+          </a:p>
+          <a:p>
+            <a:endParaRPr lang="en-US" dirty="0"/>
+          </a:p>
+          <a:p>
+            <a:endParaRPr lang="en-US" dirty="0"/>
+          </a:p>
+        </p:txBody>
+      </p:sp>
+      <p:sp>
+        <p:nvSpPr>
+          <p:cNvPr id="4" name="Slide Number Placeholder 3">
+            <a:extLst>
+              <a:ext uri="{FF2B5EF4-FFF2-40B4-BE49-F238E27FC236}">
+                <a16:creationId xmlns:a16="http://schemas.microsoft.com/office/drawing/2014/main" id="{BDAF7946-1B13-1C40-9F2E-DF5B8603CFD2}"/>
+              </a:ext>
+            </a:extLst>
+          </p:cNvPr>
+          <p:cNvSpPr>
+            <a:spLocks noGrp="1"/>
+          </p:cNvSpPr>
+          <p:nvPr>
+            <p:ph type="sldNum" sz="quarter" idx="12"/>
+          </p:nvPr>
+        </p:nvSpPr>
+        <p:spPr/>
+        <p:txBody>
+          <a:bodyPr/>
+          <a:lstStyle/>
+          <a:p>
+            <a:fld id="{3352CBF5-17B8-4387-88A6-ABF9F8C64D5A}" type="slidenum">
+              <a:rPr lang="en-US" smtClean="0"/>
+              <a:t>17</a:t>
+            </a:fld>
+            <a:endParaRPr lang="en-US"/>
+          </a:p>
+        </p:txBody>
+      </p:sp>
+    </p:spTree>
+    <p:extLst>
+      <p:ext uri="{BB962C8B-B14F-4D97-AF65-F5344CB8AC3E}">
+        <p14:creationId xmlns:p14="http://schemas.microsoft.com/office/powerpoint/2010/main" val="2037131543"/>
+      </p:ext>
+    </p:extLst>
+  </p:cSld>
+  <p:clrMapOvr>
+    <a:masterClrMapping/>
+  </p:clrMapOvr>
+</p:sld>
+</file>
+
+<file path=ppt/slides/slide18.xml><?xml version="1.0" encoding="utf-8"?>
+<p:sld xmlns:a="http://schemas.openxmlformats.org/drawingml/2006/main" xmlns:r="http://schemas.openxmlformats.org/officeDocument/2006/relationships" xmlns:p="http://schemas.openxmlformats.org/presentationml/2006/main">
+  <p:cSld>
+    <p:spTree>
+      <p:nvGrpSpPr>
+        <p:cNvPr id="1" name=""/>
+        <p:cNvGrpSpPr/>
+        <p:nvPr/>
+      </p:nvGrpSpPr>
+      <p:grpSpPr>
+        <a:xfrm>
+          <a:off x="0" y="0"/>
+          <a:ext cx="0" cy="0"/>
+          <a:chOff x="0" y="0"/>
+          <a:chExt cx="0" cy="0"/>
+        </a:xfrm>
+      </p:grpSpPr>
+      <p:sp>
+        <p:nvSpPr>
+          <p:cNvPr id="2" name="Title 1">
+            <a:extLst>
+              <a:ext uri="{FF2B5EF4-FFF2-40B4-BE49-F238E27FC236}">
                 <a16:creationId xmlns:a16="http://schemas.microsoft.com/office/drawing/2014/main" id="{AB513616-7AC4-8D4A-9A6E-FA6366817B0D}"/>
               </a:ext>
             </a:extLst>
@@ -5053,7 +5529,7 @@
           <a:p>
             <a:fld id="{3352CBF5-17B8-4387-88A6-ABF9F8C64D5A}" type="slidenum">
               <a:rPr lang="en-US" smtClean="0"/>
-              <a:t>17</a:t>
+              <a:t>18</a:t>
             </a:fld>
             <a:endParaRPr lang="en-US"/>
           </a:p>
@@ -5072,7 +5548,7 @@
 </p:sld>
 </file>
 
-<file path=ppt/slides/slide18.xml><?xml version="1.0" encoding="utf-8"?>
+<file path=ppt/slides/slide19.xml><?xml version="1.0" encoding="utf-8"?>
 <p:sld xmlns:a="http://schemas.openxmlformats.org/drawingml/2006/main" xmlns:r="http://schemas.openxmlformats.org/officeDocument/2006/relationships" xmlns:p="http://schemas.openxmlformats.org/presentationml/2006/main">
   <p:cSld>
     <p:bg>
@@ -5343,7 +5819,7 @@
           <a:p>
             <a:fld id="{3352CBF5-17B8-4387-88A6-ABF9F8C64D5A}" type="slidenum">
               <a:rPr lang="en-US" smtClean="0"/>
-              <a:t>18</a:t>
+              <a:t>19</a:t>
             </a:fld>
             <a:endParaRPr lang="en-US"/>
           </a:p>

</xml_diff>